<commit_message>
Updated login sequence diagram
</commit_message>
<xml_diff>
--- a/docs/diagrams/LoginSequenceDiagram.pptx
+++ b/docs/diagrams/LoginSequenceDiagram.pptx
@@ -208,7 +208,7 @@
           <a:p>
             <a:fld id="{F5CC4B3F-88C1-4FFA-B1B6-F41C21DC6924}" type="datetimeFigureOut">
               <a:rPr lang="en-US" smtClean="0"/>
-              <a:t>11/11/2018</a:t>
+              <a:t>11/12/2018</a:t>
             </a:fld>
             <a:endParaRPr lang="en-US"/>
           </a:p>
@@ -654,7 +654,7 @@
           <a:p>
             <a:fld id="{78C97017-6FC3-485B-9764-EAC9E56C1D49}" type="datetimeFigureOut">
               <a:rPr lang="en-US" smtClean="0"/>
-              <a:t>11/11/2018</a:t>
+              <a:t>11/12/2018</a:t>
             </a:fld>
             <a:endParaRPr lang="en-US"/>
           </a:p>
@@ -822,7 +822,7 @@
           <a:p>
             <a:fld id="{78C97017-6FC3-485B-9764-EAC9E56C1D49}" type="datetimeFigureOut">
               <a:rPr lang="en-US" smtClean="0"/>
-              <a:t>11/11/2018</a:t>
+              <a:t>11/12/2018</a:t>
             </a:fld>
             <a:endParaRPr lang="en-US"/>
           </a:p>
@@ -1000,7 +1000,7 @@
           <a:p>
             <a:fld id="{78C97017-6FC3-485B-9764-EAC9E56C1D49}" type="datetimeFigureOut">
               <a:rPr lang="en-US" smtClean="0"/>
-              <a:t>11/11/2018</a:t>
+              <a:t>11/12/2018</a:t>
             </a:fld>
             <a:endParaRPr lang="en-US"/>
           </a:p>
@@ -1168,7 +1168,7 @@
           <a:p>
             <a:fld id="{78C97017-6FC3-485B-9764-EAC9E56C1D49}" type="datetimeFigureOut">
               <a:rPr lang="en-US" smtClean="0"/>
-              <a:t>11/11/2018</a:t>
+              <a:t>11/12/2018</a:t>
             </a:fld>
             <a:endParaRPr lang="en-US"/>
           </a:p>
@@ -1413,7 +1413,7 @@
           <a:p>
             <a:fld id="{78C97017-6FC3-485B-9764-EAC9E56C1D49}" type="datetimeFigureOut">
               <a:rPr lang="en-US" smtClean="0"/>
-              <a:t>11/11/2018</a:t>
+              <a:t>11/12/2018</a:t>
             </a:fld>
             <a:endParaRPr lang="en-US"/>
           </a:p>
@@ -1698,7 +1698,7 @@
           <a:p>
             <a:fld id="{78C97017-6FC3-485B-9764-EAC9E56C1D49}" type="datetimeFigureOut">
               <a:rPr lang="en-US" smtClean="0"/>
-              <a:t>11/11/2018</a:t>
+              <a:t>11/12/2018</a:t>
             </a:fld>
             <a:endParaRPr lang="en-US"/>
           </a:p>
@@ -2117,7 +2117,7 @@
           <a:p>
             <a:fld id="{78C97017-6FC3-485B-9764-EAC9E56C1D49}" type="datetimeFigureOut">
               <a:rPr lang="en-US" smtClean="0"/>
-              <a:t>11/11/2018</a:t>
+              <a:t>11/12/2018</a:t>
             </a:fld>
             <a:endParaRPr lang="en-US"/>
           </a:p>
@@ -2234,7 +2234,7 @@
           <a:p>
             <a:fld id="{78C97017-6FC3-485B-9764-EAC9E56C1D49}" type="datetimeFigureOut">
               <a:rPr lang="en-US" smtClean="0"/>
-              <a:t>11/11/2018</a:t>
+              <a:t>11/12/2018</a:t>
             </a:fld>
             <a:endParaRPr lang="en-US"/>
           </a:p>
@@ -2329,7 +2329,7 @@
           <a:p>
             <a:fld id="{78C97017-6FC3-485B-9764-EAC9E56C1D49}" type="datetimeFigureOut">
               <a:rPr lang="en-US" smtClean="0"/>
-              <a:t>11/11/2018</a:t>
+              <a:t>11/12/2018</a:t>
             </a:fld>
             <a:endParaRPr lang="en-US"/>
           </a:p>
@@ -2604,7 +2604,7 @@
           <a:p>
             <a:fld id="{78C97017-6FC3-485B-9764-EAC9E56C1D49}" type="datetimeFigureOut">
               <a:rPr lang="en-US" smtClean="0"/>
-              <a:t>11/11/2018</a:t>
+              <a:t>11/12/2018</a:t>
             </a:fld>
             <a:endParaRPr lang="en-US"/>
           </a:p>
@@ -2856,7 +2856,7 @@
           <a:p>
             <a:fld id="{78C97017-6FC3-485B-9764-EAC9E56C1D49}" type="datetimeFigureOut">
               <a:rPr lang="en-US" smtClean="0"/>
-              <a:t>11/11/2018</a:t>
+              <a:t>11/12/2018</a:t>
             </a:fld>
             <a:endParaRPr lang="en-US"/>
           </a:p>
@@ -3067,7 +3067,7 @@
           <a:p>
             <a:fld id="{78C97017-6FC3-485B-9764-EAC9E56C1D49}" type="datetimeFigureOut">
               <a:rPr lang="en-US" smtClean="0"/>
-              <a:t>11/11/2018</a:t>
+              <a:t>11/12/2018</a:t>
             </a:fld>
             <a:endParaRPr lang="en-US"/>
           </a:p>
@@ -3450,8 +3450,8 @@
         </p:nvSpPr>
         <p:spPr>
           <a:xfrm>
-            <a:off x="6459374" y="118895"/>
-            <a:ext cx="3903825" cy="4400926"/>
+            <a:off x="6459374" y="163017"/>
+            <a:ext cx="3903825" cy="6412667"/>
           </a:xfrm>
           <a:prstGeom prst="roundRect">
             <a:avLst>
@@ -3511,8 +3511,8 @@
         </p:nvSpPr>
         <p:spPr>
           <a:xfrm>
-            <a:off x="467813" y="163018"/>
-            <a:ext cx="5863964" cy="4343400"/>
+            <a:off x="38099" y="163018"/>
+            <a:ext cx="6293678" cy="6456790"/>
           </a:xfrm>
           <a:prstGeom prst="roundRect">
             <a:avLst>

</xml_diff>